<commit_message>
[bug] fix bug 60181
</commit_message>
<xml_diff>
--- a/slide/themes/src/08_safari.pptx
+++ b/slide/themes/src/08_safari.pptx
@@ -844,7 +844,7 @@
             <a:spLocks noGrp="1"/>
           </p:cNvSpPr>
           <p:nvPr>
-            <p:ph sz="half" idx="2" hasCustomPrompt="1"/>
+            <p:ph sz="half" idx="2"/>
           </p:nvPr>
         </p:nvSpPr>
         <p:spPr>
@@ -904,7 +904,7 @@
             <a:spLocks noGrp="1"/>
           </p:cNvSpPr>
           <p:nvPr>
-            <p:ph sz="quarter" idx="13" hasCustomPrompt="1"/>
+            <p:ph sz="quarter" idx="13"/>
           </p:nvPr>
         </p:nvSpPr>
         <p:spPr>

</xml_diff>